<commit_message>
adiciona link para o projeto de exemplo Games no Azure DevOps
</commit_message>
<xml_diff>
--- a/avaliacao/escopo.pptx
+++ b/avaliacao/escopo.pptx
@@ -8458,7 +8458,6 @@
               <a:rPr lang="en" dirty="0"/>
               <a:t>Desta forma, com a pipeline criada, a cada novo push na branch dev, um novo release é gerado com a nova funcionalidade integrada.</a:t>
             </a:r>
-            <a:endParaRPr lang="pt-BR" dirty="0"/>
           </a:p>
           <a:p>
             <a:pPr lvl="1" indent="-342900">
@@ -8467,24 +8466,22 @@
               </a:spcBef>
               <a:buSzPts val="1800"/>
             </a:pPr>
-            <a:endParaRPr lang="en" dirty="0"/>
-          </a:p>
-          <a:p>
-            <a:pPr lvl="1" indent="-342900">
-              <a:spcBef>
-                <a:spcPts val="0"/>
-              </a:spcBef>
-              <a:buSzPts val="1800"/>
-            </a:pPr>
-            <a:endParaRPr lang="en" dirty="0"/>
-          </a:p>
-          <a:p>
-            <a:pPr lvl="1" indent="-342900">
-              <a:spcBef>
-                <a:spcPts val="0"/>
-              </a:spcBef>
-              <a:buSzPts val="1800"/>
-            </a:pPr>
+            <a:r>
+              <a:rPr lang="en" dirty="0"/>
+              <a:t>Link para o projeto de exemplo Games hospedado no Azure Devops: </a:t>
+            </a:r>
+            <a:r>
+              <a:rPr lang="en-US" dirty="0">
+                <a:hlinkClick r:id="rId3"/>
+              </a:rPr>
+              <a:t>Summary - Overview (azure.</a:t>
+            </a:r>
+            <a:r>
+              <a:rPr lang="en-US">
+                <a:hlinkClick r:id="rId3"/>
+              </a:rPr>
+              <a:t>com)</a:t>
+            </a:r>
             <a:endParaRPr lang="en" dirty="0"/>
           </a:p>
           <a:p>
@@ -9156,6 +9153,67 @@
                                           <p:spTgt spid="74">
                                             <p:txEl>
                                               <p:pRg st="9" end="9"/>
+                                            </p:txEl>
+                                          </p:spTgt>
+                                        </p:tgtEl>
+                                      </p:cBhvr>
+                                    </p:animEffect>
+                                  </p:childTnLst>
+                                </p:cTn>
+                              </p:par>
+                            </p:childTnLst>
+                          </p:cTn>
+                        </p:par>
+                      </p:childTnLst>
+                    </p:cTn>
+                  </p:par>
+                  <p:par>
+                    <p:cTn id="53" fill="hold">
+                      <p:stCondLst>
+                        <p:cond delay="indefinite"/>
+                      </p:stCondLst>
+                      <p:childTnLst>
+                        <p:par>
+                          <p:cTn id="54" fill="hold">
+                            <p:stCondLst>
+                              <p:cond delay="0"/>
+                            </p:stCondLst>
+                            <p:childTnLst>
+                              <p:par>
+                                <p:cTn id="55" presetID="10" presetClass="entr" presetSubtype="0" fill="hold" nodeType="clickEffect">
+                                  <p:stCondLst>
+                                    <p:cond delay="0"/>
+                                  </p:stCondLst>
+                                  <p:childTnLst>
+                                    <p:set>
+                                      <p:cBhvr>
+                                        <p:cTn id="56" dur="1" fill="hold">
+                                          <p:stCondLst>
+                                            <p:cond delay="0"/>
+                                          </p:stCondLst>
+                                        </p:cTn>
+                                        <p:tgtEl>
+                                          <p:spTgt spid="74">
+                                            <p:txEl>
+                                              <p:pRg st="10" end="10"/>
+                                            </p:txEl>
+                                          </p:spTgt>
+                                        </p:tgtEl>
+                                        <p:attrNameLst>
+                                          <p:attrName>style.visibility</p:attrName>
+                                        </p:attrNameLst>
+                                      </p:cBhvr>
+                                      <p:to>
+                                        <p:strVal val="visible"/>
+                                      </p:to>
+                                    </p:set>
+                                    <p:animEffect transition="in" filter="fade">
+                                      <p:cBhvr>
+                                        <p:cTn id="57" dur="500"/>
+                                        <p:tgtEl>
+                                          <p:spTgt spid="74">
+                                            <p:txEl>
+                                              <p:pRg st="10" end="10"/>
                                             </p:txEl>
                                           </p:spTgt>
                                         </p:tgtEl>

</xml_diff>